<commit_message>
minor changes to docu
</commit_message>
<xml_diff>
--- a/Dokumentation_DBS/Wahlinformationssystem.pptx
+++ b/Dokumentation_DBS/Wahlinformationssystem.pptx
@@ -9,8 +9,8 @@
     <p:sldId id="257" r:id="rId3"/>
     <p:sldId id="258" r:id="rId4"/>
     <p:sldId id="259" r:id="rId5"/>
-    <p:sldId id="260" r:id="rId6"/>
-    <p:sldId id="261" r:id="rId7"/>
+    <p:sldId id="261" r:id="rId6"/>
+    <p:sldId id="260" r:id="rId7"/>
     <p:sldId id="262" r:id="rId8"/>
   </p:sldIdLst>
   <p:sldSz cx="12192000" cy="6858000"/>
@@ -862,6 +862,7 @@
           <a:p>
             <a:fld id="{5B8CA15C-7B95-4119-9423-2B31253BA466}" type="datetimeFigureOut">
               <a:rPr lang="de-DE" smtClean="0"/>
+              <a:pPr/>
               <a:t>24.01.2018</a:t>
             </a:fld>
             <a:endParaRPr lang="de-DE"/>
@@ -904,6 +905,7 @@
           <a:p>
             <a:fld id="{B09A4D7A-301D-4336-B5B4-2A21CFDE5693}" type="slidenum">
               <a:rPr lang="de-DE" smtClean="0"/>
+              <a:pPr/>
               <a:t>‹Nr.›</a:t>
             </a:fld>
             <a:endParaRPr lang="de-DE"/>
@@ -913,7 +915,7 @@
     </p:spTree>
     <p:extLst>
       <p:ext uri="{BB962C8B-B14F-4D97-AF65-F5344CB8AC3E}">
-        <p14:creationId xmlns:p14="http://schemas.microsoft.com/office/powerpoint/2010/main" val="2209013501"/>
+        <p14:creationId xmlns="" xmlns:p14="http://schemas.microsoft.com/office/powerpoint/2010/main" val="2209013501"/>
       </p:ext>
     </p:extLst>
   </p:cSld>
@@ -1113,6 +1115,7 @@
           <a:p>
             <a:fld id="{5B8CA15C-7B95-4119-9423-2B31253BA466}" type="datetimeFigureOut">
               <a:rPr lang="de-DE" smtClean="0"/>
+              <a:pPr/>
               <a:t>24.01.2018</a:t>
             </a:fld>
             <a:endParaRPr lang="de-DE"/>
@@ -1155,6 +1158,7 @@
           <a:p>
             <a:fld id="{B09A4D7A-301D-4336-B5B4-2A21CFDE5693}" type="slidenum">
               <a:rPr lang="de-DE" smtClean="0"/>
+              <a:pPr/>
               <a:t>‹Nr.›</a:t>
             </a:fld>
             <a:endParaRPr lang="de-DE"/>
@@ -1164,7 +1168,7 @@
     </p:spTree>
     <p:extLst>
       <p:ext uri="{BB962C8B-B14F-4D97-AF65-F5344CB8AC3E}">
-        <p14:creationId xmlns:p14="http://schemas.microsoft.com/office/powerpoint/2010/main" val="1168019940"/>
+        <p14:creationId xmlns="" xmlns:p14="http://schemas.microsoft.com/office/powerpoint/2010/main" val="1168019940"/>
       </p:ext>
     </p:extLst>
   </p:cSld>
@@ -1427,6 +1431,7 @@
           <a:p>
             <a:fld id="{5B8CA15C-7B95-4119-9423-2B31253BA466}" type="datetimeFigureOut">
               <a:rPr lang="de-DE" smtClean="0"/>
+              <a:pPr/>
               <a:t>24.01.2018</a:t>
             </a:fld>
             <a:endParaRPr lang="de-DE"/>
@@ -1469,6 +1474,7 @@
           <a:p>
             <a:fld id="{B09A4D7A-301D-4336-B5B4-2A21CFDE5693}" type="slidenum">
               <a:rPr lang="de-DE" smtClean="0"/>
+              <a:pPr/>
               <a:t>‹Nr.›</a:t>
             </a:fld>
             <a:endParaRPr lang="de-DE"/>
@@ -1560,7 +1566,7 @@
     </p:spTree>
     <p:extLst>
       <p:ext uri="{BB962C8B-B14F-4D97-AF65-F5344CB8AC3E}">
-        <p14:creationId xmlns:p14="http://schemas.microsoft.com/office/powerpoint/2010/main" val="506617100"/>
+        <p14:creationId xmlns="" xmlns:p14="http://schemas.microsoft.com/office/powerpoint/2010/main" val="506617100"/>
       </p:ext>
     </p:extLst>
   </p:cSld>
@@ -1760,6 +1766,7 @@
           <a:p>
             <a:fld id="{5B8CA15C-7B95-4119-9423-2B31253BA466}" type="datetimeFigureOut">
               <a:rPr lang="de-DE" smtClean="0"/>
+              <a:pPr/>
               <a:t>24.01.2018</a:t>
             </a:fld>
             <a:endParaRPr lang="de-DE"/>
@@ -1802,6 +1809,7 @@
           <a:p>
             <a:fld id="{B09A4D7A-301D-4336-B5B4-2A21CFDE5693}" type="slidenum">
               <a:rPr lang="de-DE" smtClean="0"/>
+              <a:pPr/>
               <a:t>‹Nr.›</a:t>
             </a:fld>
             <a:endParaRPr lang="de-DE"/>
@@ -1811,7 +1819,7 @@
     </p:spTree>
     <p:extLst>
       <p:ext uri="{BB962C8B-B14F-4D97-AF65-F5344CB8AC3E}">
-        <p14:creationId xmlns:p14="http://schemas.microsoft.com/office/powerpoint/2010/main" val="2580881076"/>
+        <p14:creationId xmlns="" xmlns:p14="http://schemas.microsoft.com/office/powerpoint/2010/main" val="2580881076"/>
       </p:ext>
     </p:extLst>
   </p:cSld>
@@ -2074,6 +2082,7 @@
           <a:p>
             <a:fld id="{5B8CA15C-7B95-4119-9423-2B31253BA466}" type="datetimeFigureOut">
               <a:rPr lang="de-DE" smtClean="0"/>
+              <a:pPr/>
               <a:t>24.01.2018</a:t>
             </a:fld>
             <a:endParaRPr lang="de-DE"/>
@@ -2116,6 +2125,7 @@
           <a:p>
             <a:fld id="{B09A4D7A-301D-4336-B5B4-2A21CFDE5693}" type="slidenum">
               <a:rPr lang="de-DE" smtClean="0"/>
+              <a:pPr/>
               <a:t>‹Nr.›</a:t>
             </a:fld>
             <a:endParaRPr lang="de-DE"/>
@@ -2207,7 +2217,7 @@
     </p:spTree>
     <p:extLst>
       <p:ext uri="{BB962C8B-B14F-4D97-AF65-F5344CB8AC3E}">
-        <p14:creationId xmlns:p14="http://schemas.microsoft.com/office/powerpoint/2010/main" val="2487870441"/>
+        <p14:creationId xmlns="" xmlns:p14="http://schemas.microsoft.com/office/powerpoint/2010/main" val="2487870441"/>
       </p:ext>
     </p:extLst>
   </p:cSld>
@@ -2467,6 +2477,7 @@
           <a:p>
             <a:fld id="{5B8CA15C-7B95-4119-9423-2B31253BA466}" type="datetimeFigureOut">
               <a:rPr lang="de-DE" smtClean="0"/>
+              <a:pPr/>
               <a:t>24.01.2018</a:t>
             </a:fld>
             <a:endParaRPr lang="de-DE"/>
@@ -2509,6 +2520,7 @@
           <a:p>
             <a:fld id="{B09A4D7A-301D-4336-B5B4-2A21CFDE5693}" type="slidenum">
               <a:rPr lang="de-DE" smtClean="0"/>
+              <a:pPr/>
               <a:t>‹Nr.›</a:t>
             </a:fld>
             <a:endParaRPr lang="de-DE"/>
@@ -2518,7 +2530,7 @@
     </p:spTree>
     <p:extLst>
       <p:ext uri="{BB962C8B-B14F-4D97-AF65-F5344CB8AC3E}">
-        <p14:creationId xmlns:p14="http://schemas.microsoft.com/office/powerpoint/2010/main" val="1010947022"/>
+        <p14:creationId xmlns="" xmlns:p14="http://schemas.microsoft.com/office/powerpoint/2010/main" val="1010947022"/>
       </p:ext>
     </p:extLst>
   </p:cSld>
@@ -2637,6 +2649,7 @@
           <a:p>
             <a:fld id="{5B8CA15C-7B95-4119-9423-2B31253BA466}" type="datetimeFigureOut">
               <a:rPr lang="de-DE" smtClean="0"/>
+              <a:pPr/>
               <a:t>24.01.2018</a:t>
             </a:fld>
             <a:endParaRPr lang="de-DE"/>
@@ -2679,6 +2692,7 @@
           <a:p>
             <a:fld id="{B09A4D7A-301D-4336-B5B4-2A21CFDE5693}" type="slidenum">
               <a:rPr lang="de-DE" smtClean="0"/>
+              <a:pPr/>
               <a:t>‹Nr.›</a:t>
             </a:fld>
             <a:endParaRPr lang="de-DE"/>
@@ -2688,7 +2702,7 @@
     </p:spTree>
     <p:extLst>
       <p:ext uri="{BB962C8B-B14F-4D97-AF65-F5344CB8AC3E}">
-        <p14:creationId xmlns:p14="http://schemas.microsoft.com/office/powerpoint/2010/main" val="32114067"/>
+        <p14:creationId xmlns="" xmlns:p14="http://schemas.microsoft.com/office/powerpoint/2010/main" val="32114067"/>
       </p:ext>
     </p:extLst>
   </p:cSld>
@@ -2817,6 +2831,7 @@
           <a:p>
             <a:fld id="{5B8CA15C-7B95-4119-9423-2B31253BA466}" type="datetimeFigureOut">
               <a:rPr lang="de-DE" smtClean="0"/>
+              <a:pPr/>
               <a:t>24.01.2018</a:t>
             </a:fld>
             <a:endParaRPr lang="de-DE"/>
@@ -2859,6 +2874,7 @@
           <a:p>
             <a:fld id="{B09A4D7A-301D-4336-B5B4-2A21CFDE5693}" type="slidenum">
               <a:rPr lang="de-DE" smtClean="0"/>
+              <a:pPr/>
               <a:t>‹Nr.›</a:t>
             </a:fld>
             <a:endParaRPr lang="de-DE"/>
@@ -2868,7 +2884,7 @@
     </p:spTree>
     <p:extLst>
       <p:ext uri="{BB962C8B-B14F-4D97-AF65-F5344CB8AC3E}">
-        <p14:creationId xmlns:p14="http://schemas.microsoft.com/office/powerpoint/2010/main" val="4099669198"/>
+        <p14:creationId xmlns="" xmlns:p14="http://schemas.microsoft.com/office/powerpoint/2010/main" val="4099669198"/>
       </p:ext>
     </p:extLst>
   </p:cSld>
@@ -2987,6 +3003,7 @@
           <a:p>
             <a:fld id="{5B8CA15C-7B95-4119-9423-2B31253BA466}" type="datetimeFigureOut">
               <a:rPr lang="de-DE" smtClean="0"/>
+              <a:pPr/>
               <a:t>24.01.2018</a:t>
             </a:fld>
             <a:endParaRPr lang="de-DE"/>
@@ -3029,6 +3046,7 @@
           <a:p>
             <a:fld id="{B09A4D7A-301D-4336-B5B4-2A21CFDE5693}" type="slidenum">
               <a:rPr lang="de-DE" smtClean="0"/>
+              <a:pPr/>
               <a:t>‹Nr.›</a:t>
             </a:fld>
             <a:endParaRPr lang="de-DE"/>
@@ -3038,7 +3056,7 @@
     </p:spTree>
     <p:extLst>
       <p:ext uri="{BB962C8B-B14F-4D97-AF65-F5344CB8AC3E}">
-        <p14:creationId xmlns:p14="http://schemas.microsoft.com/office/powerpoint/2010/main" val="1414103084"/>
+        <p14:creationId xmlns="" xmlns:p14="http://schemas.microsoft.com/office/powerpoint/2010/main" val="1414103084"/>
       </p:ext>
     </p:extLst>
   </p:cSld>
@@ -3234,6 +3252,7 @@
           <a:p>
             <a:fld id="{5B8CA15C-7B95-4119-9423-2B31253BA466}" type="datetimeFigureOut">
               <a:rPr lang="de-DE" smtClean="0"/>
+              <a:pPr/>
               <a:t>24.01.2018</a:t>
             </a:fld>
             <a:endParaRPr lang="de-DE"/>
@@ -3276,6 +3295,7 @@
           <a:p>
             <a:fld id="{B09A4D7A-301D-4336-B5B4-2A21CFDE5693}" type="slidenum">
               <a:rPr lang="de-DE" smtClean="0"/>
+              <a:pPr/>
               <a:t>‹Nr.›</a:t>
             </a:fld>
             <a:endParaRPr lang="de-DE"/>
@@ -3285,7 +3305,7 @@
     </p:spTree>
     <p:extLst>
       <p:ext uri="{BB962C8B-B14F-4D97-AF65-F5344CB8AC3E}">
-        <p14:creationId xmlns:p14="http://schemas.microsoft.com/office/powerpoint/2010/main" val="2154173768"/>
+        <p14:creationId xmlns="" xmlns:p14="http://schemas.microsoft.com/office/powerpoint/2010/main" val="2154173768"/>
       </p:ext>
     </p:extLst>
   </p:cSld>
@@ -3466,6 +3486,7 @@
           <a:p>
             <a:fld id="{5B8CA15C-7B95-4119-9423-2B31253BA466}" type="datetimeFigureOut">
               <a:rPr lang="de-DE" smtClean="0"/>
+              <a:pPr/>
               <a:t>24.01.2018</a:t>
             </a:fld>
             <a:endParaRPr lang="de-DE"/>
@@ -3508,6 +3529,7 @@
           <a:p>
             <a:fld id="{B09A4D7A-301D-4336-B5B4-2A21CFDE5693}" type="slidenum">
               <a:rPr lang="de-DE" smtClean="0"/>
+              <a:pPr/>
               <a:t>‹Nr.›</a:t>
             </a:fld>
             <a:endParaRPr lang="de-DE"/>
@@ -3517,7 +3539,7 @@
     </p:spTree>
     <p:extLst>
       <p:ext uri="{BB962C8B-B14F-4D97-AF65-F5344CB8AC3E}">
-        <p14:creationId xmlns:p14="http://schemas.microsoft.com/office/powerpoint/2010/main" val="2690741683"/>
+        <p14:creationId xmlns="" xmlns:p14="http://schemas.microsoft.com/office/powerpoint/2010/main" val="2690741683"/>
       </p:ext>
     </p:extLst>
   </p:cSld>
@@ -3840,6 +3862,7 @@
           <a:p>
             <a:fld id="{5B8CA15C-7B95-4119-9423-2B31253BA466}" type="datetimeFigureOut">
               <a:rPr lang="de-DE" smtClean="0"/>
+              <a:pPr/>
               <a:t>24.01.2018</a:t>
             </a:fld>
             <a:endParaRPr lang="de-DE"/>
@@ -3882,6 +3905,7 @@
           <a:p>
             <a:fld id="{B09A4D7A-301D-4336-B5B4-2A21CFDE5693}" type="slidenum">
               <a:rPr lang="de-DE" smtClean="0"/>
+              <a:pPr/>
               <a:t>‹Nr.›</a:t>
             </a:fld>
             <a:endParaRPr lang="de-DE"/>
@@ -3891,7 +3915,7 @@
     </p:spTree>
     <p:extLst>
       <p:ext uri="{BB962C8B-B14F-4D97-AF65-F5344CB8AC3E}">
-        <p14:creationId xmlns:p14="http://schemas.microsoft.com/office/powerpoint/2010/main" val="3719385744"/>
+        <p14:creationId xmlns="" xmlns:p14="http://schemas.microsoft.com/office/powerpoint/2010/main" val="3719385744"/>
       </p:ext>
     </p:extLst>
   </p:cSld>
@@ -3963,6 +3987,7 @@
           <a:p>
             <a:fld id="{5B8CA15C-7B95-4119-9423-2B31253BA466}" type="datetimeFigureOut">
               <a:rPr lang="de-DE" smtClean="0"/>
+              <a:pPr/>
               <a:t>24.01.2018</a:t>
             </a:fld>
             <a:endParaRPr lang="de-DE"/>
@@ -4005,6 +4030,7 @@
           <a:p>
             <a:fld id="{B09A4D7A-301D-4336-B5B4-2A21CFDE5693}" type="slidenum">
               <a:rPr lang="de-DE" smtClean="0"/>
+              <a:pPr/>
               <a:t>‹Nr.›</a:t>
             </a:fld>
             <a:endParaRPr lang="de-DE"/>
@@ -4014,7 +4040,7 @@
     </p:spTree>
     <p:extLst>
       <p:ext uri="{BB962C8B-B14F-4D97-AF65-F5344CB8AC3E}">
-        <p14:creationId xmlns:p14="http://schemas.microsoft.com/office/powerpoint/2010/main" val="3363674527"/>
+        <p14:creationId xmlns="" xmlns:p14="http://schemas.microsoft.com/office/powerpoint/2010/main" val="3363674527"/>
       </p:ext>
     </p:extLst>
   </p:cSld>
@@ -4058,6 +4084,7 @@
           <a:p>
             <a:fld id="{5B8CA15C-7B95-4119-9423-2B31253BA466}" type="datetimeFigureOut">
               <a:rPr lang="de-DE" smtClean="0"/>
+              <a:pPr/>
               <a:t>24.01.2018</a:t>
             </a:fld>
             <a:endParaRPr lang="de-DE"/>
@@ -4100,6 +4127,7 @@
           <a:p>
             <a:fld id="{B09A4D7A-301D-4336-B5B4-2A21CFDE5693}" type="slidenum">
               <a:rPr lang="de-DE" smtClean="0"/>
+              <a:pPr/>
               <a:t>‹Nr.›</a:t>
             </a:fld>
             <a:endParaRPr lang="de-DE"/>
@@ -4109,7 +4137,7 @@
     </p:spTree>
     <p:extLst>
       <p:ext uri="{BB962C8B-B14F-4D97-AF65-F5344CB8AC3E}">
-        <p14:creationId xmlns:p14="http://schemas.microsoft.com/office/powerpoint/2010/main" val="4045767544"/>
+        <p14:creationId xmlns="" xmlns:p14="http://schemas.microsoft.com/office/powerpoint/2010/main" val="4045767544"/>
       </p:ext>
     </p:extLst>
   </p:cSld>
@@ -4313,6 +4341,7 @@
           <a:p>
             <a:fld id="{5B8CA15C-7B95-4119-9423-2B31253BA466}" type="datetimeFigureOut">
               <a:rPr lang="de-DE" smtClean="0"/>
+              <a:pPr/>
               <a:t>24.01.2018</a:t>
             </a:fld>
             <a:endParaRPr lang="de-DE"/>
@@ -4355,6 +4384,7 @@
           <a:p>
             <a:fld id="{B09A4D7A-301D-4336-B5B4-2A21CFDE5693}" type="slidenum">
               <a:rPr lang="de-DE" smtClean="0"/>
+              <a:pPr/>
               <a:t>‹Nr.›</a:t>
             </a:fld>
             <a:endParaRPr lang="de-DE"/>
@@ -4364,7 +4394,7 @@
     </p:spTree>
     <p:extLst>
       <p:ext uri="{BB962C8B-B14F-4D97-AF65-F5344CB8AC3E}">
-        <p14:creationId xmlns:p14="http://schemas.microsoft.com/office/powerpoint/2010/main" val="3991926202"/>
+        <p14:creationId xmlns="" xmlns:p14="http://schemas.microsoft.com/office/powerpoint/2010/main" val="3991926202"/>
       </p:ext>
     </p:extLst>
   </p:cSld>
@@ -4595,6 +4625,7 @@
           <a:p>
             <a:fld id="{B09A4D7A-301D-4336-B5B4-2A21CFDE5693}" type="slidenum">
               <a:rPr lang="de-DE" smtClean="0"/>
+              <a:pPr/>
               <a:t>‹Nr.›</a:t>
             </a:fld>
             <a:endParaRPr lang="de-DE"/>
@@ -4618,6 +4649,7 @@
           <a:p>
             <a:fld id="{5B8CA15C-7B95-4119-9423-2B31253BA466}" type="datetimeFigureOut">
               <a:rPr lang="de-DE" smtClean="0"/>
+              <a:pPr/>
               <a:t>24.01.2018</a:t>
             </a:fld>
             <a:endParaRPr lang="de-DE"/>
@@ -4627,7 +4659,7 @@
     </p:spTree>
     <p:extLst>
       <p:ext uri="{BB962C8B-B14F-4D97-AF65-F5344CB8AC3E}">
-        <p14:creationId xmlns:p14="http://schemas.microsoft.com/office/powerpoint/2010/main" val="2747765771"/>
+        <p14:creationId xmlns="" xmlns:p14="http://schemas.microsoft.com/office/powerpoint/2010/main" val="2747765771"/>
       </p:ext>
     </p:extLst>
   </p:cSld>
@@ -5320,6 +5352,7 @@
           <a:p>
             <a:fld id="{5B8CA15C-7B95-4119-9423-2B31253BA466}" type="datetimeFigureOut">
               <a:rPr lang="de-DE" smtClean="0"/>
+              <a:pPr/>
               <a:t>24.01.2018</a:t>
             </a:fld>
             <a:endParaRPr lang="de-DE"/>
@@ -5396,6 +5429,7 @@
           <a:p>
             <a:fld id="{B09A4D7A-301D-4336-B5B4-2A21CFDE5693}" type="slidenum">
               <a:rPr lang="de-DE" smtClean="0"/>
+              <a:pPr/>
               <a:t>‹Nr.›</a:t>
             </a:fld>
             <a:endParaRPr lang="de-DE"/>
@@ -5405,7 +5439,7 @@
     </p:spTree>
     <p:extLst>
       <p:ext uri="{BB962C8B-B14F-4D97-AF65-F5344CB8AC3E}">
-        <p14:creationId xmlns:p14="http://schemas.microsoft.com/office/powerpoint/2010/main" val="313167865"/>
+        <p14:creationId xmlns="" xmlns:p14="http://schemas.microsoft.com/office/powerpoint/2010/main" val="313167865"/>
       </p:ext>
     </p:extLst>
   </p:cSld>
@@ -5849,7 +5883,7 @@
           <p:cNvPr id="2" name="Titel 1">
             <a:extLst>
               <a:ext uri="{FF2B5EF4-FFF2-40B4-BE49-F238E27FC236}">
-                <a16:creationId xmlns:a16="http://schemas.microsoft.com/office/drawing/2014/main" id="{BE9111EE-1A19-45B6-B583-19121CE9691E}"/>
+                <a16:creationId xmlns="" xmlns:a16="http://schemas.microsoft.com/office/drawing/2014/main" id="{BE9111EE-1A19-45B6-B583-19121CE9691E}"/>
               </a:ext>
             </a:extLst>
           </p:cNvPr>
@@ -5877,7 +5911,7 @@
           <p:cNvPr id="3" name="Untertitel 2">
             <a:extLst>
               <a:ext uri="{FF2B5EF4-FFF2-40B4-BE49-F238E27FC236}">
-                <a16:creationId xmlns:a16="http://schemas.microsoft.com/office/drawing/2014/main" id="{DEDEF8DC-CC71-481F-A26A-293EEA0C420F}"/>
+                <a16:creationId xmlns="" xmlns:a16="http://schemas.microsoft.com/office/drawing/2014/main" id="{DEDEF8DC-CC71-481F-A26A-293EEA0C420F}"/>
               </a:ext>
             </a:extLst>
           </p:cNvPr>
@@ -5911,7 +5945,7 @@
     </p:spTree>
     <p:extLst>
       <p:ext uri="{BB962C8B-B14F-4D97-AF65-F5344CB8AC3E}">
-        <p14:creationId xmlns:p14="http://schemas.microsoft.com/office/powerpoint/2010/main" val="423747497"/>
+        <p14:creationId xmlns="" xmlns:p14="http://schemas.microsoft.com/office/powerpoint/2010/main" val="423747497"/>
       </p:ext>
     </p:extLst>
   </p:cSld>
@@ -5943,7 +5977,7 @@
           <p:cNvPr id="2" name="Titel 1">
             <a:extLst>
               <a:ext uri="{FF2B5EF4-FFF2-40B4-BE49-F238E27FC236}">
-                <a16:creationId xmlns:a16="http://schemas.microsoft.com/office/drawing/2014/main" id="{D2580CF6-E8E4-45A5-9EF5-E9501C170EC0}"/>
+                <a16:creationId xmlns="" xmlns:a16="http://schemas.microsoft.com/office/drawing/2014/main" id="{D2580CF6-E8E4-45A5-9EF5-E9501C170EC0}"/>
               </a:ext>
             </a:extLst>
           </p:cNvPr>
@@ -5971,7 +6005,7 @@
           <p:cNvPr id="3" name="Inhaltsplatzhalter 2">
             <a:extLst>
               <a:ext uri="{FF2B5EF4-FFF2-40B4-BE49-F238E27FC236}">
-                <a16:creationId xmlns:a16="http://schemas.microsoft.com/office/drawing/2014/main" id="{1962F44C-8CA1-4935-B94C-FFA9FF69F4ED}"/>
+                <a16:creationId xmlns="" xmlns:a16="http://schemas.microsoft.com/office/drawing/2014/main" id="{1962F44C-8CA1-4935-B94C-FFA9FF69F4ED}"/>
               </a:ext>
             </a:extLst>
           </p:cNvPr>
@@ -6040,7 +6074,7 @@
     </p:spTree>
     <p:extLst>
       <p:ext uri="{BB962C8B-B14F-4D97-AF65-F5344CB8AC3E}">
-        <p14:creationId xmlns:p14="http://schemas.microsoft.com/office/powerpoint/2010/main" val="1499659384"/>
+        <p14:creationId xmlns="" xmlns:p14="http://schemas.microsoft.com/office/powerpoint/2010/main" val="1499659384"/>
       </p:ext>
     </p:extLst>
   </p:cSld>
@@ -6072,7 +6106,7 @@
           <p:cNvPr id="2" name="Titel 1">
             <a:extLst>
               <a:ext uri="{FF2B5EF4-FFF2-40B4-BE49-F238E27FC236}">
-                <a16:creationId xmlns:a16="http://schemas.microsoft.com/office/drawing/2014/main" id="{D20A38D7-D660-410D-BF1F-46AE1BD3353F}"/>
+                <a16:creationId xmlns="" xmlns:a16="http://schemas.microsoft.com/office/drawing/2014/main" id="{D20A38D7-D660-410D-BF1F-46AE1BD3353F}"/>
               </a:ext>
             </a:extLst>
           </p:cNvPr>
@@ -6100,7 +6134,7 @@
           <p:cNvPr id="3" name="Inhaltsplatzhalter 2">
             <a:extLst>
               <a:ext uri="{FF2B5EF4-FFF2-40B4-BE49-F238E27FC236}">
-                <a16:creationId xmlns:a16="http://schemas.microsoft.com/office/drawing/2014/main" id="{B24A2D1C-3AB4-4882-B347-804531F0FAB7}"/>
+                <a16:creationId xmlns="" xmlns:a16="http://schemas.microsoft.com/office/drawing/2014/main" id="{B24A2D1C-3AB4-4882-B347-804531F0FAB7}"/>
               </a:ext>
             </a:extLst>
           </p:cNvPr>
@@ -6126,7 +6160,7 @@
     </p:spTree>
     <p:extLst>
       <p:ext uri="{BB962C8B-B14F-4D97-AF65-F5344CB8AC3E}">
-        <p14:creationId xmlns:p14="http://schemas.microsoft.com/office/powerpoint/2010/main" val="2141421944"/>
+        <p14:creationId xmlns="" xmlns:p14="http://schemas.microsoft.com/office/powerpoint/2010/main" val="2141421944"/>
       </p:ext>
     </p:extLst>
   </p:cSld>
@@ -6158,7 +6192,7 @@
           <p:cNvPr id="4" name="Grafik 3">
             <a:extLst>
               <a:ext uri="{FF2B5EF4-FFF2-40B4-BE49-F238E27FC236}">
-                <a16:creationId xmlns:a16="http://schemas.microsoft.com/office/drawing/2014/main" id="{7765FD6B-97C0-4283-9BCD-640B0AA3C486}"/>
+                <a16:creationId xmlns="" xmlns:a16="http://schemas.microsoft.com/office/drawing/2014/main" id="{7765FD6B-97C0-4283-9BCD-640B0AA3C486}"/>
               </a:ext>
             </a:extLst>
           </p:cNvPr>
@@ -6187,7 +6221,7 @@
           <p:cNvPr id="2" name="Titel 1">
             <a:extLst>
               <a:ext uri="{FF2B5EF4-FFF2-40B4-BE49-F238E27FC236}">
-                <a16:creationId xmlns:a16="http://schemas.microsoft.com/office/drawing/2014/main" id="{4A9A6223-560A-455A-863F-87A7829ED075}"/>
+                <a16:creationId xmlns="" xmlns:a16="http://schemas.microsoft.com/office/drawing/2014/main" id="{4A9A6223-560A-455A-863F-87A7829ED075}"/>
               </a:ext>
             </a:extLst>
           </p:cNvPr>
@@ -6215,7 +6249,7 @@
           <p:cNvPr id="3" name="Inhaltsplatzhalter 2">
             <a:extLst>
               <a:ext uri="{FF2B5EF4-FFF2-40B4-BE49-F238E27FC236}">
-                <a16:creationId xmlns:a16="http://schemas.microsoft.com/office/drawing/2014/main" id="{FC7B5028-AAF3-4332-8EAF-C4B90A4654C0}"/>
+                <a16:creationId xmlns="" xmlns:a16="http://schemas.microsoft.com/office/drawing/2014/main" id="{FC7B5028-AAF3-4332-8EAF-C4B90A4654C0}"/>
               </a:ext>
             </a:extLst>
           </p:cNvPr>
@@ -6255,7 +6289,7 @@
     </p:spTree>
     <p:extLst>
       <p:ext uri="{BB962C8B-B14F-4D97-AF65-F5344CB8AC3E}">
-        <p14:creationId xmlns:p14="http://schemas.microsoft.com/office/powerpoint/2010/main" val="2520515316"/>
+        <p14:creationId xmlns="" xmlns:p14="http://schemas.microsoft.com/office/powerpoint/2010/main" val="2520515316"/>
       </p:ext>
     </p:extLst>
   </p:cSld>
@@ -6287,7 +6321,7 @@
           <p:cNvPr id="2" name="Titel 1">
             <a:extLst>
               <a:ext uri="{FF2B5EF4-FFF2-40B4-BE49-F238E27FC236}">
-                <a16:creationId xmlns:a16="http://schemas.microsoft.com/office/drawing/2014/main" id="{8463F52A-F4EB-4E4A-BC5F-48415D312192}"/>
+                <a16:creationId xmlns="" xmlns:a16="http://schemas.microsoft.com/office/drawing/2014/main" id="{9877583C-2800-4B12-8D91-D075C9AFE479}"/>
               </a:ext>
             </a:extLst>
           </p:cNvPr>
@@ -6304,8 +6338,12 @@
           <a:lstStyle/>
           <a:p>
             <a:r>
+              <a:rPr lang="de-DE" dirty="0" smtClean="0"/>
+              <a:t>Besonderheit - </a:t>
+            </a:r>
+            <a:r>
               <a:rPr lang="de-DE" dirty="0"/>
-              <a:t>Besonderheit Systemanleitung</a:t>
+              <a:t>Security</a:t>
             </a:r>
           </a:p>
         </p:txBody>
@@ -6315,7 +6353,7 @@
           <p:cNvPr id="3" name="Inhaltsplatzhalter 2">
             <a:extLst>
               <a:ext uri="{FF2B5EF4-FFF2-40B4-BE49-F238E27FC236}">
-                <a16:creationId xmlns:a16="http://schemas.microsoft.com/office/drawing/2014/main" id="{142D86F0-AA7B-491C-AAD9-2047F310B032}"/>
+                <a16:creationId xmlns="" xmlns:a16="http://schemas.microsoft.com/office/drawing/2014/main" id="{C436DD66-B191-4A19-9ECE-DCF25E5D256C}"/>
               </a:ext>
             </a:extLst>
           </p:cNvPr>
@@ -6328,36 +6366,20 @@
         </p:nvSpPr>
         <p:spPr/>
         <p:txBody>
-          <a:bodyPr>
-            <a:normAutofit/>
-          </a:bodyPr>
-          <a:lstStyle/>
-          <a:p>
-            <a:r>
-              <a:rPr lang="de-DE" dirty="0"/>
-              <a:t>Anleitung zum Aufsetzen der Datenbank</a:t>
-            </a:r>
-          </a:p>
-          <a:p>
-            <a:r>
-              <a:rPr lang="de-DE" dirty="0"/>
-              <a:t>Funktionsfähige Webapp zum </a:t>
-            </a:r>
-            <a:r>
-              <a:rPr lang="de-DE" dirty="0" err="1"/>
-              <a:t>Deployment</a:t>
-            </a:r>
-            <a:r>
-              <a:rPr lang="de-DE" dirty="0"/>
-              <a:t> im Webcontainer</a:t>
-            </a:r>
+          <a:bodyPr/>
+          <a:lstStyle/>
+          <a:p>
+            <a:pPr marL="0" indent="0">
+              <a:buNone/>
+            </a:pPr>
+            <a:endParaRPr lang="de-DE" dirty="0"/>
           </a:p>
         </p:txBody>
       </p:sp>
     </p:spTree>
     <p:extLst>
       <p:ext uri="{BB962C8B-B14F-4D97-AF65-F5344CB8AC3E}">
-        <p14:creationId xmlns:p14="http://schemas.microsoft.com/office/powerpoint/2010/main" val="2560159104"/>
+        <p14:creationId xmlns="" xmlns:p14="http://schemas.microsoft.com/office/powerpoint/2010/main" val="2501459456"/>
       </p:ext>
     </p:extLst>
   </p:cSld>
@@ -6389,7 +6411,7 @@
           <p:cNvPr id="2" name="Titel 1">
             <a:extLst>
               <a:ext uri="{FF2B5EF4-FFF2-40B4-BE49-F238E27FC236}">
-                <a16:creationId xmlns:a16="http://schemas.microsoft.com/office/drawing/2014/main" id="{9877583C-2800-4B12-8D91-D075C9AFE479}"/>
+                <a16:creationId xmlns="" xmlns:a16="http://schemas.microsoft.com/office/drawing/2014/main" id="{8463F52A-F4EB-4E4A-BC5F-48415D312192}"/>
               </a:ext>
             </a:extLst>
           </p:cNvPr>
@@ -6407,8 +6429,13 @@
           <a:p>
             <a:r>
               <a:rPr lang="de-DE" dirty="0"/>
-              <a:t>Besonderheit Security</a:t>
-            </a:r>
+              <a:t>Besonderheit </a:t>
+            </a:r>
+            <a:r>
+              <a:rPr lang="de-DE" dirty="0" smtClean="0"/>
+              <a:t>- Systemanleitung</a:t>
+            </a:r>
+            <a:endParaRPr lang="de-DE" dirty="0"/>
           </a:p>
         </p:txBody>
       </p:sp>
@@ -6417,7 +6444,7 @@
           <p:cNvPr id="3" name="Inhaltsplatzhalter 2">
             <a:extLst>
               <a:ext uri="{FF2B5EF4-FFF2-40B4-BE49-F238E27FC236}">
-                <a16:creationId xmlns:a16="http://schemas.microsoft.com/office/drawing/2014/main" id="{C436DD66-B191-4A19-9ECE-DCF25E5D256C}"/>
+                <a16:creationId xmlns="" xmlns:a16="http://schemas.microsoft.com/office/drawing/2014/main" id="{142D86F0-AA7B-491C-AAD9-2047F310B032}"/>
               </a:ext>
             </a:extLst>
           </p:cNvPr>
@@ -6430,20 +6457,36 @@
         </p:nvSpPr>
         <p:spPr/>
         <p:txBody>
-          <a:bodyPr/>
-          <a:lstStyle/>
-          <a:p>
-            <a:pPr marL="0" indent="0">
-              <a:buNone/>
-            </a:pPr>
-            <a:endParaRPr lang="de-DE" dirty="0"/>
+          <a:bodyPr>
+            <a:normAutofit/>
+          </a:bodyPr>
+          <a:lstStyle/>
+          <a:p>
+            <a:r>
+              <a:rPr lang="de-DE" dirty="0"/>
+              <a:t>Anleitung zum Aufsetzen der Datenbank</a:t>
+            </a:r>
+          </a:p>
+          <a:p>
+            <a:r>
+              <a:rPr lang="de-DE" dirty="0"/>
+              <a:t>Funktionsfähige Webapp zum </a:t>
+            </a:r>
+            <a:r>
+              <a:rPr lang="de-DE" dirty="0" err="1"/>
+              <a:t>Deployment</a:t>
+            </a:r>
+            <a:r>
+              <a:rPr lang="de-DE" dirty="0"/>
+              <a:t> im Webcontainer</a:t>
+            </a:r>
           </a:p>
         </p:txBody>
       </p:sp>
     </p:spTree>
     <p:extLst>
       <p:ext uri="{BB962C8B-B14F-4D97-AF65-F5344CB8AC3E}">
-        <p14:creationId xmlns:p14="http://schemas.microsoft.com/office/powerpoint/2010/main" val="2501459456"/>
+        <p14:creationId xmlns="" xmlns:p14="http://schemas.microsoft.com/office/powerpoint/2010/main" val="2560159104"/>
       </p:ext>
     </p:extLst>
   </p:cSld>
@@ -6475,7 +6518,7 @@
           <p:cNvPr id="4" name="Titel 3">
             <a:extLst>
               <a:ext uri="{FF2B5EF4-FFF2-40B4-BE49-F238E27FC236}">
-                <a16:creationId xmlns:a16="http://schemas.microsoft.com/office/drawing/2014/main" id="{50AB2189-80C4-4053-9A1B-5300C95D9291}"/>
+                <a16:creationId xmlns="" xmlns:a16="http://schemas.microsoft.com/office/drawing/2014/main" id="{50AB2189-80C4-4053-9A1B-5300C95D9291}"/>
               </a:ext>
             </a:extLst>
           </p:cNvPr>
@@ -6501,7 +6544,7 @@
     </p:spTree>
     <p:extLst>
       <p:ext uri="{BB962C8B-B14F-4D97-AF65-F5344CB8AC3E}">
-        <p14:creationId xmlns:p14="http://schemas.microsoft.com/office/powerpoint/2010/main" val="4089166736"/>
+        <p14:creationId xmlns="" xmlns:p14="http://schemas.microsoft.com/office/powerpoint/2010/main" val="4089166736"/>
       </p:ext>
     </p:extLst>
   </p:cSld>
@@ -6554,7 +6597,7 @@
     </a:clrScheme>
     <a:fontScheme name="Facette">
       <a:majorFont>
-        <a:latin typeface="Trebuchet MS" panose="020B0603020202020204"/>
+        <a:latin typeface="Trebuchet MS"/>
         <a:ea typeface=""/>
         <a:cs typeface=""/>
         <a:font script="Jpan" typeface="メイリオ"/>
@@ -6589,7 +6632,7 @@
         <a:font script="Geor" typeface="Sylfaen"/>
       </a:majorFont>
       <a:minorFont>
-        <a:latin typeface="Trebuchet MS" panose="020B0603020202020204"/>
+        <a:latin typeface="Trebuchet MS"/>
         <a:ea typeface=""/>
         <a:cs typeface=""/>
         <a:font script="Jpan" typeface="メイリオ"/>
@@ -6762,7 +6805,7 @@
   <a:extraClrSchemeLst/>
   <a:extLst>
     <a:ext uri="{05A4C25C-085E-4340-85A3-A5531E510DB2}">
-      <thm15:themeFamily xmlns:thm15="http://schemas.microsoft.com/office/thememl/2012/main" name="Facet" id="{C0C680CD-088A-49FC-A102-D699147F32B2}" vid="{0B5AB586-D108-4FC1-8368-649FE654B894}"/>
+      <thm15:themeFamily xmlns="" xmlns:thm15="http://schemas.microsoft.com/office/thememl/2012/main" name="Facet" id="{C0C680CD-088A-49FC-A102-D699147F32B2}" vid="{0B5AB586-D108-4FC1-8368-649FE654B894}"/>
     </a:ext>
   </a:extLst>
 </a:theme>

</xml_diff>